<commit_message>
update Andriod 10 1_pixel3_image
</commit_message>
<xml_diff>
--- a/Android10/0_Intro_Pixel3_Android10.pptx
+++ b/Android10/0_Intro_Pixel3_Android10.pptx
@@ -162,6 +162,446 @@
 
 <file path=ppt/changesInfos/changesInfo1.xml><?xml version="1.0" encoding="utf-8"?>
 <pc:chgInfo xmlns:a="http://schemas.openxmlformats.org/drawingml/2006/main" xmlns:r="http://schemas.openxmlformats.org/officeDocument/2006/relationships" xmlns:ac="http://schemas.microsoft.com/office/drawing/2013/main/command" xmlns:pc="http://schemas.microsoft.com/office/powerpoint/2013/main/command">
+  <pc:docChgLst>
+    <pc:chgData name="Richard Wheeless" userId="S::id63la41@ubalt.edu::edf7d7f9-5d95-4eec-886d-0f745236a21b" providerId="AD" clId="Web-{EFDB7389-BEFA-A459-AC04-7036D2800BAB}"/>
+    <pc:docChg chg="sldOrd">
+      <pc:chgData name="Richard Wheeless" userId="S::id63la41@ubalt.edu::edf7d7f9-5d95-4eec-886d-0f745236a21b" providerId="AD" clId="Web-{EFDB7389-BEFA-A459-AC04-7036D2800BAB}" dt="2021-02-05T04:30:08.248" v="0"/>
+      <pc:docMkLst>
+        <pc:docMk/>
+      </pc:docMkLst>
+      <pc:sldChg chg="ord">
+        <pc:chgData name="Richard Wheeless" userId="S::id63la41@ubalt.edu::edf7d7f9-5d95-4eec-886d-0f745236a21b" providerId="AD" clId="Web-{EFDB7389-BEFA-A459-AC04-7036D2800BAB}" dt="2021-02-05T04:30:08.248" v="0"/>
+        <pc:sldMkLst>
+          <pc:docMk/>
+          <pc:sldMk cId="2219828795" sldId="263"/>
+        </pc:sldMkLst>
+      </pc:sldChg>
+    </pc:docChg>
+  </pc:docChgLst>
+  <pc:docChgLst>
+    <pc:chgData name="Weifeng Xu" userId="e7aed605-a3dd-4d5a-a692-a87037af107b" providerId="ADAL" clId="{E0A36AE6-DAEB-4086-8CDB-3902B8401090}"/>
+    <pc:docChg chg="undo custSel mod addSld delSld modSld">
+      <pc:chgData name="Weifeng Xu" userId="e7aed605-a3dd-4d5a-a692-a87037af107b" providerId="ADAL" clId="{E0A36AE6-DAEB-4086-8CDB-3902B8401090}" dt="2021-01-18T00:01:06.800" v="260" actId="6549"/>
+      <pc:docMkLst>
+        <pc:docMk/>
+      </pc:docMkLst>
+      <pc:sldChg chg="addSp delSp modSp mod setBg">
+        <pc:chgData name="Weifeng Xu" userId="e7aed605-a3dd-4d5a-a692-a87037af107b" providerId="ADAL" clId="{E0A36AE6-DAEB-4086-8CDB-3902B8401090}" dt="2021-01-17T23:59:46.284" v="256" actId="26606"/>
+        <pc:sldMkLst>
+          <pc:docMk/>
+          <pc:sldMk cId="1392771324" sldId="258"/>
+        </pc:sldMkLst>
+      </pc:sldChg>
+      <pc:sldChg chg="del">
+        <pc:chgData name="Weifeng Xu" userId="e7aed605-a3dd-4d5a-a692-a87037af107b" providerId="ADAL" clId="{E0A36AE6-DAEB-4086-8CDB-3902B8401090}" dt="2021-01-17T23:45:25.843" v="81" actId="47"/>
+        <pc:sldMkLst>
+          <pc:docMk/>
+          <pc:sldMk cId="627889270" sldId="259"/>
+        </pc:sldMkLst>
+      </pc:sldChg>
+      <pc:sldChg chg="modSp new mod">
+        <pc:chgData name="Weifeng Xu" userId="e7aed605-a3dd-4d5a-a692-a87037af107b" providerId="ADAL" clId="{E0A36AE6-DAEB-4086-8CDB-3902B8401090}" dt="2021-01-17T23:53:10.893" v="178" actId="20577"/>
+        <pc:sldMkLst>
+          <pc:docMk/>
+          <pc:sldMk cId="2206727044" sldId="259"/>
+        </pc:sldMkLst>
+      </pc:sldChg>
+      <pc:sldChg chg="del">
+        <pc:chgData name="Weifeng Xu" userId="e7aed605-a3dd-4d5a-a692-a87037af107b" providerId="ADAL" clId="{E0A36AE6-DAEB-4086-8CDB-3902B8401090}" dt="2021-01-17T23:45:25.974" v="82" actId="47"/>
+        <pc:sldMkLst>
+          <pc:docMk/>
+          <pc:sldMk cId="1241162418" sldId="260"/>
+        </pc:sldMkLst>
+      </pc:sldChg>
+      <pc:sldChg chg="addSp modSp new mod setBg">
+        <pc:chgData name="Weifeng Xu" userId="e7aed605-a3dd-4d5a-a692-a87037af107b" providerId="ADAL" clId="{E0A36AE6-DAEB-4086-8CDB-3902B8401090}" dt="2021-01-18T00:01:06.800" v="260" actId="6549"/>
+        <pc:sldMkLst>
+          <pc:docMk/>
+          <pc:sldMk cId="3022601266" sldId="260"/>
+        </pc:sldMkLst>
+      </pc:sldChg>
+      <pc:sldChg chg="del">
+        <pc:chgData name="Weifeng Xu" userId="e7aed605-a3dd-4d5a-a692-a87037af107b" providerId="ADAL" clId="{E0A36AE6-DAEB-4086-8CDB-3902B8401090}" dt="2021-01-17T23:45:26.140" v="83" actId="47"/>
+        <pc:sldMkLst>
+          <pc:docMk/>
+          <pc:sldMk cId="2722048472" sldId="261"/>
+        </pc:sldMkLst>
+      </pc:sldChg>
+      <pc:sldChg chg="del">
+        <pc:chgData name="Weifeng Xu" userId="e7aed605-a3dd-4d5a-a692-a87037af107b" providerId="ADAL" clId="{E0A36AE6-DAEB-4086-8CDB-3902B8401090}" dt="2021-01-17T23:45:26.285" v="84" actId="47"/>
+        <pc:sldMkLst>
+          <pc:docMk/>
+          <pc:sldMk cId="988553735" sldId="262"/>
+        </pc:sldMkLst>
+      </pc:sldChg>
+      <pc:sldChg chg="del">
+        <pc:chgData name="Weifeng Xu" userId="e7aed605-a3dd-4d5a-a692-a87037af107b" providerId="ADAL" clId="{E0A36AE6-DAEB-4086-8CDB-3902B8401090}" dt="2021-01-17T23:45:26.428" v="85" actId="47"/>
+        <pc:sldMkLst>
+          <pc:docMk/>
+          <pc:sldMk cId="1237432803" sldId="263"/>
+        </pc:sldMkLst>
+      </pc:sldChg>
+      <pc:sldChg chg="del">
+        <pc:chgData name="Weifeng Xu" userId="e7aed605-a3dd-4d5a-a692-a87037af107b" providerId="ADAL" clId="{E0A36AE6-DAEB-4086-8CDB-3902B8401090}" dt="2021-01-17T23:45:26.580" v="86" actId="47"/>
+        <pc:sldMkLst>
+          <pc:docMk/>
+          <pc:sldMk cId="2602603962" sldId="264"/>
+        </pc:sldMkLst>
+      </pc:sldChg>
+      <pc:sldChg chg="del">
+        <pc:chgData name="Weifeng Xu" userId="e7aed605-a3dd-4d5a-a692-a87037af107b" providerId="ADAL" clId="{E0A36AE6-DAEB-4086-8CDB-3902B8401090}" dt="2021-01-17T23:45:26.781" v="87" actId="47"/>
+        <pc:sldMkLst>
+          <pc:docMk/>
+          <pc:sldMk cId="3419174452" sldId="265"/>
+        </pc:sldMkLst>
+      </pc:sldChg>
+      <pc:sldChg chg="del">
+        <pc:chgData name="Weifeng Xu" userId="e7aed605-a3dd-4d5a-a692-a87037af107b" providerId="ADAL" clId="{E0A36AE6-DAEB-4086-8CDB-3902B8401090}" dt="2021-01-17T23:45:26.965" v="88" actId="47"/>
+        <pc:sldMkLst>
+          <pc:docMk/>
+          <pc:sldMk cId="1160958258" sldId="266"/>
+        </pc:sldMkLst>
+      </pc:sldChg>
+    </pc:docChg>
+  </pc:docChgLst>
+  <pc:docChgLst>
+    <pc:chgData name="Weifeng Xu" userId="e7aed605-a3dd-4d5a-a692-a87037af107b" providerId="ADAL" clId="{4DC338DC-19C7-41EB-B9B2-C1FF8A2AEED8}"/>
+    <pc:docChg chg="undo custSel addSld delSld modSld">
+      <pc:chgData name="Weifeng Xu" userId="e7aed605-a3dd-4d5a-a692-a87037af107b" providerId="ADAL" clId="{4DC338DC-19C7-41EB-B9B2-C1FF8A2AEED8}" dt="2021-03-23T16:38:52.946" v="845" actId="20577"/>
+      <pc:docMkLst>
+        <pc:docMk/>
+      </pc:docMkLst>
+      <pc:sldChg chg="del">
+        <pc:chgData name="Weifeng Xu" userId="e7aed605-a3dd-4d5a-a692-a87037af107b" providerId="ADAL" clId="{4DC338DC-19C7-41EB-B9B2-C1FF8A2AEED8}" dt="2021-03-22T02:26:14.535" v="832" actId="47"/>
+        <pc:sldMkLst>
+          <pc:docMk/>
+          <pc:sldMk cId="594714798" sldId="257"/>
+        </pc:sldMkLst>
+      </pc:sldChg>
+      <pc:sldChg chg="del">
+        <pc:chgData name="Weifeng Xu" userId="e7aed605-a3dd-4d5a-a692-a87037af107b" providerId="ADAL" clId="{4DC338DC-19C7-41EB-B9B2-C1FF8A2AEED8}" dt="2021-03-22T02:26:14.965" v="833" actId="47"/>
+        <pc:sldMkLst>
+          <pc:docMk/>
+          <pc:sldMk cId="824954207" sldId="258"/>
+        </pc:sldMkLst>
+      </pc:sldChg>
+      <pc:sldChg chg="del">
+        <pc:chgData name="Weifeng Xu" userId="e7aed605-a3dd-4d5a-a692-a87037af107b" providerId="ADAL" clId="{4DC338DC-19C7-41EB-B9B2-C1FF8A2AEED8}" dt="2021-03-22T02:26:16.367" v="834" actId="47"/>
+        <pc:sldMkLst>
+          <pc:docMk/>
+          <pc:sldMk cId="357665137" sldId="259"/>
+        </pc:sldMkLst>
+      </pc:sldChg>
+      <pc:sldChg chg="del">
+        <pc:chgData name="Weifeng Xu" userId="e7aed605-a3dd-4d5a-a692-a87037af107b" providerId="ADAL" clId="{4DC338DC-19C7-41EB-B9B2-C1FF8A2AEED8}" dt="2021-03-22T02:26:14.036" v="831" actId="47"/>
+        <pc:sldMkLst>
+          <pc:docMk/>
+          <pc:sldMk cId="838394385" sldId="260"/>
+        </pc:sldMkLst>
+      </pc:sldChg>
+      <pc:sldChg chg="del">
+        <pc:chgData name="Weifeng Xu" userId="e7aed605-a3dd-4d5a-a692-a87037af107b" providerId="ADAL" clId="{4DC338DC-19C7-41EB-B9B2-C1FF8A2AEED8}" dt="2021-03-16T13:51:20.310" v="141" actId="47"/>
+        <pc:sldMkLst>
+          <pc:docMk/>
+          <pc:sldMk cId="1483570226" sldId="264"/>
+        </pc:sldMkLst>
+      </pc:sldChg>
+      <pc:sldChg chg="modSp mod">
+        <pc:chgData name="Weifeng Xu" userId="e7aed605-a3dd-4d5a-a692-a87037af107b" providerId="ADAL" clId="{4DC338DC-19C7-41EB-B9B2-C1FF8A2AEED8}" dt="2021-03-23T16:38:52.946" v="845" actId="20577"/>
+        <pc:sldMkLst>
+          <pc:docMk/>
+          <pc:sldMk cId="1005714408" sldId="265"/>
+        </pc:sldMkLst>
+      </pc:sldChg>
+      <pc:sldChg chg="del">
+        <pc:chgData name="Weifeng Xu" userId="e7aed605-a3dd-4d5a-a692-a87037af107b" providerId="ADAL" clId="{4DC338DC-19C7-41EB-B9B2-C1FF8A2AEED8}" dt="2021-03-16T13:51:39.529" v="142" actId="47"/>
+        <pc:sldMkLst>
+          <pc:docMk/>
+          <pc:sldMk cId="4260313878" sldId="273"/>
+        </pc:sldMkLst>
+      </pc:sldChg>
+      <pc:sldChg chg="modSp mod">
+        <pc:chgData name="Weifeng Xu" userId="e7aed605-a3dd-4d5a-a692-a87037af107b" providerId="ADAL" clId="{4DC338DC-19C7-41EB-B9B2-C1FF8A2AEED8}" dt="2021-03-19T15:30:07.079" v="417" actId="20577"/>
+        <pc:sldMkLst>
+          <pc:docMk/>
+          <pc:sldMk cId="2351248153" sldId="279"/>
+        </pc:sldMkLst>
+      </pc:sldChg>
+      <pc:sldChg chg="del">
+        <pc:chgData name="Weifeng Xu" userId="e7aed605-a3dd-4d5a-a692-a87037af107b" providerId="ADAL" clId="{4DC338DC-19C7-41EB-B9B2-C1FF8A2AEED8}" dt="2021-03-22T02:26:13.469" v="830" actId="47"/>
+        <pc:sldMkLst>
+          <pc:docMk/>
+          <pc:sldMk cId="4291129217" sldId="282"/>
+        </pc:sldMkLst>
+      </pc:sldChg>
+      <pc:sldChg chg="addSp modSp del mod">
+        <pc:chgData name="Weifeng Xu" userId="e7aed605-a3dd-4d5a-a692-a87037af107b" providerId="ADAL" clId="{4DC338DC-19C7-41EB-B9B2-C1FF8A2AEED8}" dt="2021-03-22T02:26:17.284" v="836" actId="47"/>
+        <pc:sldMkLst>
+          <pc:docMk/>
+          <pc:sldMk cId="1345239187" sldId="283"/>
+        </pc:sldMkLst>
+      </pc:sldChg>
+      <pc:sldChg chg="addSp delSp modSp del mod">
+        <pc:chgData name="Weifeng Xu" userId="e7aed605-a3dd-4d5a-a692-a87037af107b" providerId="ADAL" clId="{4DC338DC-19C7-41EB-B9B2-C1FF8A2AEED8}" dt="2021-03-22T02:26:17.872" v="837" actId="47"/>
+        <pc:sldMkLst>
+          <pc:docMk/>
+          <pc:sldMk cId="988206790" sldId="284"/>
+        </pc:sldMkLst>
+      </pc:sldChg>
+      <pc:sldChg chg="modSp del mod">
+        <pc:chgData name="Weifeng Xu" userId="e7aed605-a3dd-4d5a-a692-a87037af107b" providerId="ADAL" clId="{4DC338DC-19C7-41EB-B9B2-C1FF8A2AEED8}" dt="2021-03-22T02:26:18.440" v="838" actId="47"/>
+        <pc:sldMkLst>
+          <pc:docMk/>
+          <pc:sldMk cId="848153081" sldId="285"/>
+        </pc:sldMkLst>
+      </pc:sldChg>
+      <pc:sldChg chg="modSp del mod">
+        <pc:chgData name="Weifeng Xu" userId="e7aed605-a3dd-4d5a-a692-a87037af107b" providerId="ADAL" clId="{4DC338DC-19C7-41EB-B9B2-C1FF8A2AEED8}" dt="2021-03-22T02:26:20.669" v="842" actId="47"/>
+        <pc:sldMkLst>
+          <pc:docMk/>
+          <pc:sldMk cId="319929686" sldId="286"/>
+        </pc:sldMkLst>
+      </pc:sldChg>
+      <pc:sldChg chg="del">
+        <pc:chgData name="Weifeng Xu" userId="e7aed605-a3dd-4d5a-a692-a87037af107b" providerId="ADAL" clId="{4DC338DC-19C7-41EB-B9B2-C1FF8A2AEED8}" dt="2021-03-06T01:15:55.818" v="0" actId="47"/>
+        <pc:sldMkLst>
+          <pc:docMk/>
+          <pc:sldMk cId="2783025053" sldId="287"/>
+        </pc:sldMkLst>
+      </pc:sldChg>
+      <pc:sldChg chg="del">
+        <pc:chgData name="Weifeng Xu" userId="e7aed605-a3dd-4d5a-a692-a87037af107b" providerId="ADAL" clId="{4DC338DC-19C7-41EB-B9B2-C1FF8A2AEED8}" dt="2021-03-06T01:15:58.325" v="6" actId="47"/>
+        <pc:sldMkLst>
+          <pc:docMk/>
+          <pc:sldMk cId="114776636" sldId="288"/>
+        </pc:sldMkLst>
+      </pc:sldChg>
+      <pc:sldChg chg="del">
+        <pc:chgData name="Weifeng Xu" userId="e7aed605-a3dd-4d5a-a692-a87037af107b" providerId="ADAL" clId="{4DC338DC-19C7-41EB-B9B2-C1FF8A2AEED8}" dt="2021-03-06T01:15:56.509" v="1" actId="47"/>
+        <pc:sldMkLst>
+          <pc:docMk/>
+          <pc:sldMk cId="1757879576" sldId="293"/>
+        </pc:sldMkLst>
+      </pc:sldChg>
+      <pc:sldChg chg="del">
+        <pc:chgData name="Weifeng Xu" userId="e7aed605-a3dd-4d5a-a692-a87037af107b" providerId="ADAL" clId="{4DC338DC-19C7-41EB-B9B2-C1FF8A2AEED8}" dt="2021-03-06T01:15:56.918" v="2" actId="47"/>
+        <pc:sldMkLst>
+          <pc:docMk/>
+          <pc:sldMk cId="2207446241" sldId="294"/>
+        </pc:sldMkLst>
+      </pc:sldChg>
+      <pc:sldChg chg="del">
+        <pc:chgData name="Weifeng Xu" userId="e7aed605-a3dd-4d5a-a692-a87037af107b" providerId="ADAL" clId="{4DC338DC-19C7-41EB-B9B2-C1FF8A2AEED8}" dt="2021-03-22T02:26:16.816" v="835" actId="47"/>
+        <pc:sldMkLst>
+          <pc:docMk/>
+          <pc:sldMk cId="2323005149" sldId="296"/>
+        </pc:sldMkLst>
+      </pc:sldChg>
+      <pc:sldChg chg="del">
+        <pc:chgData name="Weifeng Xu" userId="e7aed605-a3dd-4d5a-a692-a87037af107b" providerId="ADAL" clId="{4DC338DC-19C7-41EB-B9B2-C1FF8A2AEED8}" dt="2021-03-06T01:15:57.141" v="3" actId="47"/>
+        <pc:sldMkLst>
+          <pc:docMk/>
+          <pc:sldMk cId="2224677796" sldId="297"/>
+        </pc:sldMkLst>
+      </pc:sldChg>
+      <pc:sldChg chg="del">
+        <pc:chgData name="Weifeng Xu" userId="e7aed605-a3dd-4d5a-a692-a87037af107b" providerId="ADAL" clId="{4DC338DC-19C7-41EB-B9B2-C1FF8A2AEED8}" dt="2021-03-06T01:15:57.352" v="4" actId="47"/>
+        <pc:sldMkLst>
+          <pc:docMk/>
+          <pc:sldMk cId="1105583169" sldId="298"/>
+        </pc:sldMkLst>
+      </pc:sldChg>
+      <pc:sldChg chg="del">
+        <pc:chgData name="Weifeng Xu" userId="e7aed605-a3dd-4d5a-a692-a87037af107b" providerId="ADAL" clId="{4DC338DC-19C7-41EB-B9B2-C1FF8A2AEED8}" dt="2021-03-06T01:15:57.773" v="5" actId="47"/>
+        <pc:sldMkLst>
+          <pc:docMk/>
+          <pc:sldMk cId="3471057309" sldId="299"/>
+        </pc:sldMkLst>
+      </pc:sldChg>
+      <pc:sldChg chg="del">
+        <pc:chgData name="Weifeng Xu" userId="e7aed605-a3dd-4d5a-a692-a87037af107b" providerId="ADAL" clId="{4DC338DC-19C7-41EB-B9B2-C1FF8A2AEED8}" dt="2021-03-06T01:15:58.558" v="7" actId="47"/>
+        <pc:sldMkLst>
+          <pc:docMk/>
+          <pc:sldMk cId="877061006" sldId="300"/>
+        </pc:sldMkLst>
+      </pc:sldChg>
+      <pc:sldChg chg="del">
+        <pc:chgData name="Weifeng Xu" userId="e7aed605-a3dd-4d5a-a692-a87037af107b" providerId="ADAL" clId="{4DC338DC-19C7-41EB-B9B2-C1FF8A2AEED8}" dt="2021-03-06T01:15:58.739" v="8" actId="47"/>
+        <pc:sldMkLst>
+          <pc:docMk/>
+          <pc:sldMk cId="2343196982" sldId="301"/>
+        </pc:sldMkLst>
+      </pc:sldChg>
+      <pc:sldChg chg="del">
+        <pc:chgData name="Weifeng Xu" userId="e7aed605-a3dd-4d5a-a692-a87037af107b" providerId="ADAL" clId="{4DC338DC-19C7-41EB-B9B2-C1FF8A2AEED8}" dt="2021-03-06T01:16:00.971" v="17" actId="47"/>
+        <pc:sldMkLst>
+          <pc:docMk/>
+          <pc:sldMk cId="493733997" sldId="302"/>
+        </pc:sldMkLst>
+      </pc:sldChg>
+      <pc:sldChg chg="del">
+        <pc:chgData name="Weifeng Xu" userId="e7aed605-a3dd-4d5a-a692-a87037af107b" providerId="ADAL" clId="{4DC338DC-19C7-41EB-B9B2-C1FF8A2AEED8}" dt="2021-03-06T01:15:58.930" v="9" actId="47"/>
+        <pc:sldMkLst>
+          <pc:docMk/>
+          <pc:sldMk cId="3476121000" sldId="303"/>
+        </pc:sldMkLst>
+      </pc:sldChg>
+      <pc:sldChg chg="modSp del mod">
+        <pc:chgData name="Weifeng Xu" userId="e7aed605-a3dd-4d5a-a692-a87037af107b" providerId="ADAL" clId="{4DC338DC-19C7-41EB-B9B2-C1FF8A2AEED8}" dt="2021-03-22T02:26:21.321" v="843" actId="47"/>
+        <pc:sldMkLst>
+          <pc:docMk/>
+          <pc:sldMk cId="53763807" sldId="304"/>
+        </pc:sldMkLst>
+      </pc:sldChg>
+      <pc:sldChg chg="del">
+        <pc:chgData name="Weifeng Xu" userId="e7aed605-a3dd-4d5a-a692-a87037af107b" providerId="ADAL" clId="{4DC338DC-19C7-41EB-B9B2-C1FF8A2AEED8}" dt="2021-03-06T01:15:59.145" v="10" actId="47"/>
+        <pc:sldMkLst>
+          <pc:docMk/>
+          <pc:sldMk cId="1618462415" sldId="305"/>
+        </pc:sldMkLst>
+      </pc:sldChg>
+      <pc:sldChg chg="del">
+        <pc:chgData name="Weifeng Xu" userId="e7aed605-a3dd-4d5a-a692-a87037af107b" providerId="ADAL" clId="{4DC338DC-19C7-41EB-B9B2-C1FF8A2AEED8}" dt="2021-03-06T01:15:59.352" v="11" actId="47"/>
+        <pc:sldMkLst>
+          <pc:docMk/>
+          <pc:sldMk cId="180323046" sldId="306"/>
+        </pc:sldMkLst>
+      </pc:sldChg>
+      <pc:sldChg chg="del">
+        <pc:chgData name="Weifeng Xu" userId="e7aed605-a3dd-4d5a-a692-a87037af107b" providerId="ADAL" clId="{4DC338DC-19C7-41EB-B9B2-C1FF8A2AEED8}" dt="2021-03-06T01:16:00.758" v="16" actId="47"/>
+        <pc:sldMkLst>
+          <pc:docMk/>
+          <pc:sldMk cId="3237227748" sldId="307"/>
+        </pc:sldMkLst>
+      </pc:sldChg>
+      <pc:sldChg chg="del">
+        <pc:chgData name="Weifeng Xu" userId="e7aed605-a3dd-4d5a-a692-a87037af107b" providerId="ADAL" clId="{4DC338DC-19C7-41EB-B9B2-C1FF8A2AEED8}" dt="2021-03-06T01:16:01.189" v="18" actId="47"/>
+        <pc:sldMkLst>
+          <pc:docMk/>
+          <pc:sldMk cId="1577270902" sldId="308"/>
+        </pc:sldMkLst>
+      </pc:sldChg>
+      <pc:sldChg chg="del">
+        <pc:chgData name="Weifeng Xu" userId="e7aed605-a3dd-4d5a-a692-a87037af107b" providerId="ADAL" clId="{4DC338DC-19C7-41EB-B9B2-C1FF8A2AEED8}" dt="2021-03-06T01:16:02.209" v="21" actId="47"/>
+        <pc:sldMkLst>
+          <pc:docMk/>
+          <pc:sldMk cId="181172030" sldId="309"/>
+        </pc:sldMkLst>
+      </pc:sldChg>
+      <pc:sldChg chg="del">
+        <pc:chgData name="Weifeng Xu" userId="e7aed605-a3dd-4d5a-a692-a87037af107b" providerId="ADAL" clId="{4DC338DC-19C7-41EB-B9B2-C1FF8A2AEED8}" dt="2021-03-06T01:16:01.572" v="19" actId="47"/>
+        <pc:sldMkLst>
+          <pc:docMk/>
+          <pc:sldMk cId="1809058598" sldId="310"/>
+        </pc:sldMkLst>
+      </pc:sldChg>
+      <pc:sldChg chg="del">
+        <pc:chgData name="Weifeng Xu" userId="e7aed605-a3dd-4d5a-a692-a87037af107b" providerId="ADAL" clId="{4DC338DC-19C7-41EB-B9B2-C1FF8A2AEED8}" dt="2021-03-06T01:16:01.968" v="20" actId="47"/>
+        <pc:sldMkLst>
+          <pc:docMk/>
+          <pc:sldMk cId="4192303" sldId="311"/>
+        </pc:sldMkLst>
+      </pc:sldChg>
+      <pc:sldChg chg="del">
+        <pc:chgData name="Weifeng Xu" userId="e7aed605-a3dd-4d5a-a692-a87037af107b" providerId="ADAL" clId="{4DC338DC-19C7-41EB-B9B2-C1FF8A2AEED8}" dt="2021-03-06T01:15:59.634" v="12" actId="47"/>
+        <pc:sldMkLst>
+          <pc:docMk/>
+          <pc:sldMk cId="591621681" sldId="312"/>
+        </pc:sldMkLst>
+      </pc:sldChg>
+      <pc:sldChg chg="del">
+        <pc:chgData name="Weifeng Xu" userId="e7aed605-a3dd-4d5a-a692-a87037af107b" providerId="ADAL" clId="{4DC338DC-19C7-41EB-B9B2-C1FF8A2AEED8}" dt="2021-03-06T01:15:59.941" v="13" actId="47"/>
+        <pc:sldMkLst>
+          <pc:docMk/>
+          <pc:sldMk cId="214490323" sldId="313"/>
+        </pc:sldMkLst>
+      </pc:sldChg>
+      <pc:sldChg chg="del">
+        <pc:chgData name="Weifeng Xu" userId="e7aed605-a3dd-4d5a-a692-a87037af107b" providerId="ADAL" clId="{4DC338DC-19C7-41EB-B9B2-C1FF8A2AEED8}" dt="2021-03-06T01:16:00.176" v="14" actId="47"/>
+        <pc:sldMkLst>
+          <pc:docMk/>
+          <pc:sldMk cId="3337387503" sldId="318"/>
+        </pc:sldMkLst>
+      </pc:sldChg>
+      <pc:sldChg chg="del">
+        <pc:chgData name="Weifeng Xu" userId="e7aed605-a3dd-4d5a-a692-a87037af107b" providerId="ADAL" clId="{4DC338DC-19C7-41EB-B9B2-C1FF8A2AEED8}" dt="2021-03-06T01:16:00.511" v="15" actId="47"/>
+        <pc:sldMkLst>
+          <pc:docMk/>
+          <pc:sldMk cId="2446382234" sldId="319"/>
+        </pc:sldMkLst>
+      </pc:sldChg>
+      <pc:sldChg chg="del">
+        <pc:chgData name="Weifeng Xu" userId="e7aed605-a3dd-4d5a-a692-a87037af107b" providerId="ADAL" clId="{4DC338DC-19C7-41EB-B9B2-C1FF8A2AEED8}" dt="2021-03-06T01:16:02.572" v="22" actId="47"/>
+        <pc:sldMkLst>
+          <pc:docMk/>
+          <pc:sldMk cId="3877897741" sldId="320"/>
+        </pc:sldMkLst>
+      </pc:sldChg>
+      <pc:sldChg chg="del">
+        <pc:chgData name="Weifeng Xu" userId="e7aed605-a3dd-4d5a-a692-a87037af107b" providerId="ADAL" clId="{4DC338DC-19C7-41EB-B9B2-C1FF8A2AEED8}" dt="2021-03-06T01:16:02.772" v="23" actId="47"/>
+        <pc:sldMkLst>
+          <pc:docMk/>
+          <pc:sldMk cId="926804527" sldId="321"/>
+        </pc:sldMkLst>
+      </pc:sldChg>
+      <pc:sldChg chg="add del">
+        <pc:chgData name="Weifeng Xu" userId="e7aed605-a3dd-4d5a-a692-a87037af107b" providerId="ADAL" clId="{4DC338DC-19C7-41EB-B9B2-C1FF8A2AEED8}" dt="2021-03-06T01:16:10.808" v="26" actId="47"/>
+        <pc:sldMkLst>
+          <pc:docMk/>
+          <pc:sldMk cId="3506800452" sldId="322"/>
+        </pc:sldMkLst>
+      </pc:sldChg>
+      <pc:sldChg chg="addSp modSp new del mod modClrScheme chgLayout modNotesTx">
+        <pc:chgData name="Weifeng Xu" userId="e7aed605-a3dd-4d5a-a692-a87037af107b" providerId="ADAL" clId="{4DC338DC-19C7-41EB-B9B2-C1FF8A2AEED8}" dt="2021-03-22T02:26:18.960" v="839" actId="47"/>
+        <pc:sldMkLst>
+          <pc:docMk/>
+          <pc:sldMk cId="3192494774" sldId="330"/>
+        </pc:sldMkLst>
+      </pc:sldChg>
+      <pc:sldChg chg="new del">
+        <pc:chgData name="Weifeng Xu" userId="e7aed605-a3dd-4d5a-a692-a87037af107b" providerId="ADAL" clId="{4DC338DC-19C7-41EB-B9B2-C1FF8A2AEED8}" dt="2021-03-06T15:07:54.310" v="28" actId="680"/>
+        <pc:sldMkLst>
+          <pc:docMk/>
+          <pc:sldMk cId="3204093995" sldId="330"/>
+        </pc:sldMkLst>
+      </pc:sldChg>
+      <pc:sldChg chg="addSp delSp modSp new del mod modClrScheme chgLayout modNotesTx">
+        <pc:chgData name="Weifeng Xu" userId="e7aed605-a3dd-4d5a-a692-a87037af107b" providerId="ADAL" clId="{4DC338DC-19C7-41EB-B9B2-C1FF8A2AEED8}" dt="2021-03-22T02:26:19.544" v="840" actId="47"/>
+        <pc:sldMkLst>
+          <pc:docMk/>
+          <pc:sldMk cId="2786836983" sldId="331"/>
+        </pc:sldMkLst>
+      </pc:sldChg>
+      <pc:sldChg chg="new del">
+        <pc:chgData name="Weifeng Xu" userId="e7aed605-a3dd-4d5a-a692-a87037af107b" providerId="ADAL" clId="{4DC338DC-19C7-41EB-B9B2-C1FF8A2AEED8}" dt="2021-03-06T15:39:53.920" v="76" actId="47"/>
+        <pc:sldMkLst>
+          <pc:docMk/>
+          <pc:sldMk cId="4264100167" sldId="332"/>
+        </pc:sldMkLst>
+      </pc:sldChg>
+      <pc:sldChg chg="addSp modSp new del mod">
+        <pc:chgData name="Weifeng Xu" userId="e7aed605-a3dd-4d5a-a692-a87037af107b" providerId="ADAL" clId="{4DC338DC-19C7-41EB-B9B2-C1FF8A2AEED8}" dt="2021-03-22T02:26:20.075" v="841" actId="47"/>
+        <pc:sldMkLst>
+          <pc:docMk/>
+          <pc:sldMk cId="3230497500" sldId="333"/>
+        </pc:sldMkLst>
+      </pc:sldChg>
+      <pc:sldChg chg="addSp delSp modSp new mod modClrScheme chgLayout modNotesTx">
+        <pc:chgData name="Weifeng Xu" userId="e7aed605-a3dd-4d5a-a692-a87037af107b" providerId="ADAL" clId="{4DC338DC-19C7-41EB-B9B2-C1FF8A2AEED8}" dt="2021-03-16T13:51:04.019" v="140"/>
+        <pc:sldMkLst>
+          <pc:docMk/>
+          <pc:sldMk cId="3494595657" sldId="334"/>
+        </pc:sldMkLst>
+      </pc:sldChg>
+      <pc:sldChg chg="addSp delSp modSp new mod modNotesTx">
+        <pc:chgData name="Weifeng Xu" userId="e7aed605-a3dd-4d5a-a692-a87037af107b" providerId="ADAL" clId="{4DC338DC-19C7-41EB-B9B2-C1FF8A2AEED8}" dt="2021-03-16T14:34:41.439" v="306" actId="14100"/>
+        <pc:sldMkLst>
+          <pc:docMk/>
+          <pc:sldMk cId="3364671392" sldId="335"/>
+        </pc:sldMkLst>
+      </pc:sldChg>
+    </pc:docChg>
+  </pc:docChgLst>
   <pc:docChgLst>
     <pc:chgData name="Richard Wheeless" userId="edf7d7f9-5d95-4eec-886d-0f745236a21b" providerId="ADAL" clId="{B9126330-C9DF-4823-B699-68C5989AAE60}"/>
     <pc:docChg chg="undo custSel modSld">
@@ -771,360 +1211,6 @@
         <pc:sldMkLst>
           <pc:docMk/>
           <pc:sldMk cId="1125489474" sldId="330"/>
-        </pc:sldMkLst>
-      </pc:sldChg>
-    </pc:docChg>
-  </pc:docChgLst>
-  <pc:docChgLst>
-    <pc:chgData name="Richard Wheeless" userId="S::id63la41@ubalt.edu::edf7d7f9-5d95-4eec-886d-0f745236a21b" providerId="AD" clId="Web-{EFDB7389-BEFA-A459-AC04-7036D2800BAB}"/>
-    <pc:docChg chg="sldOrd">
-      <pc:chgData name="Richard Wheeless" userId="S::id63la41@ubalt.edu::edf7d7f9-5d95-4eec-886d-0f745236a21b" providerId="AD" clId="Web-{EFDB7389-BEFA-A459-AC04-7036D2800BAB}" dt="2021-02-05T04:30:08.248" v="0"/>
-      <pc:docMkLst>
-        <pc:docMk/>
-      </pc:docMkLst>
-      <pc:sldChg chg="ord">
-        <pc:chgData name="Richard Wheeless" userId="S::id63la41@ubalt.edu::edf7d7f9-5d95-4eec-886d-0f745236a21b" providerId="AD" clId="Web-{EFDB7389-BEFA-A459-AC04-7036D2800BAB}" dt="2021-02-05T04:30:08.248" v="0"/>
-        <pc:sldMkLst>
-          <pc:docMk/>
-          <pc:sldMk cId="2219828795" sldId="263"/>
-        </pc:sldMkLst>
-      </pc:sldChg>
-    </pc:docChg>
-  </pc:docChgLst>
-  <pc:docChgLst>
-    <pc:chgData name="Weifeng Xu" userId="e7aed605-a3dd-4d5a-a692-a87037af107b" providerId="ADAL" clId="{4DC338DC-19C7-41EB-B9B2-C1FF8A2AEED8}"/>
-    <pc:docChg chg="undo custSel addSld delSld modSld">
-      <pc:chgData name="Weifeng Xu" userId="e7aed605-a3dd-4d5a-a692-a87037af107b" providerId="ADAL" clId="{4DC338DC-19C7-41EB-B9B2-C1FF8A2AEED8}" dt="2021-03-23T16:38:52.946" v="845" actId="20577"/>
-      <pc:docMkLst>
-        <pc:docMk/>
-      </pc:docMkLst>
-      <pc:sldChg chg="del">
-        <pc:chgData name="Weifeng Xu" userId="e7aed605-a3dd-4d5a-a692-a87037af107b" providerId="ADAL" clId="{4DC338DC-19C7-41EB-B9B2-C1FF8A2AEED8}" dt="2021-03-22T02:26:14.535" v="832" actId="47"/>
-        <pc:sldMkLst>
-          <pc:docMk/>
-          <pc:sldMk cId="594714798" sldId="257"/>
-        </pc:sldMkLst>
-      </pc:sldChg>
-      <pc:sldChg chg="del">
-        <pc:chgData name="Weifeng Xu" userId="e7aed605-a3dd-4d5a-a692-a87037af107b" providerId="ADAL" clId="{4DC338DC-19C7-41EB-B9B2-C1FF8A2AEED8}" dt="2021-03-22T02:26:14.965" v="833" actId="47"/>
-        <pc:sldMkLst>
-          <pc:docMk/>
-          <pc:sldMk cId="824954207" sldId="258"/>
-        </pc:sldMkLst>
-      </pc:sldChg>
-      <pc:sldChg chg="del">
-        <pc:chgData name="Weifeng Xu" userId="e7aed605-a3dd-4d5a-a692-a87037af107b" providerId="ADAL" clId="{4DC338DC-19C7-41EB-B9B2-C1FF8A2AEED8}" dt="2021-03-22T02:26:16.367" v="834" actId="47"/>
-        <pc:sldMkLst>
-          <pc:docMk/>
-          <pc:sldMk cId="357665137" sldId="259"/>
-        </pc:sldMkLst>
-      </pc:sldChg>
-      <pc:sldChg chg="del">
-        <pc:chgData name="Weifeng Xu" userId="e7aed605-a3dd-4d5a-a692-a87037af107b" providerId="ADAL" clId="{4DC338DC-19C7-41EB-B9B2-C1FF8A2AEED8}" dt="2021-03-22T02:26:14.036" v="831" actId="47"/>
-        <pc:sldMkLst>
-          <pc:docMk/>
-          <pc:sldMk cId="838394385" sldId="260"/>
-        </pc:sldMkLst>
-      </pc:sldChg>
-      <pc:sldChg chg="del">
-        <pc:chgData name="Weifeng Xu" userId="e7aed605-a3dd-4d5a-a692-a87037af107b" providerId="ADAL" clId="{4DC338DC-19C7-41EB-B9B2-C1FF8A2AEED8}" dt="2021-03-16T13:51:20.310" v="141" actId="47"/>
-        <pc:sldMkLst>
-          <pc:docMk/>
-          <pc:sldMk cId="1483570226" sldId="264"/>
-        </pc:sldMkLst>
-      </pc:sldChg>
-      <pc:sldChg chg="modSp mod">
-        <pc:chgData name="Weifeng Xu" userId="e7aed605-a3dd-4d5a-a692-a87037af107b" providerId="ADAL" clId="{4DC338DC-19C7-41EB-B9B2-C1FF8A2AEED8}" dt="2021-03-23T16:38:52.946" v="845" actId="20577"/>
-        <pc:sldMkLst>
-          <pc:docMk/>
-          <pc:sldMk cId="1005714408" sldId="265"/>
-        </pc:sldMkLst>
-      </pc:sldChg>
-      <pc:sldChg chg="del">
-        <pc:chgData name="Weifeng Xu" userId="e7aed605-a3dd-4d5a-a692-a87037af107b" providerId="ADAL" clId="{4DC338DC-19C7-41EB-B9B2-C1FF8A2AEED8}" dt="2021-03-16T13:51:39.529" v="142" actId="47"/>
-        <pc:sldMkLst>
-          <pc:docMk/>
-          <pc:sldMk cId="4260313878" sldId="273"/>
-        </pc:sldMkLst>
-      </pc:sldChg>
-      <pc:sldChg chg="modSp mod">
-        <pc:chgData name="Weifeng Xu" userId="e7aed605-a3dd-4d5a-a692-a87037af107b" providerId="ADAL" clId="{4DC338DC-19C7-41EB-B9B2-C1FF8A2AEED8}" dt="2021-03-19T15:30:07.079" v="417" actId="20577"/>
-        <pc:sldMkLst>
-          <pc:docMk/>
-          <pc:sldMk cId="2351248153" sldId="279"/>
-        </pc:sldMkLst>
-      </pc:sldChg>
-      <pc:sldChg chg="del">
-        <pc:chgData name="Weifeng Xu" userId="e7aed605-a3dd-4d5a-a692-a87037af107b" providerId="ADAL" clId="{4DC338DC-19C7-41EB-B9B2-C1FF8A2AEED8}" dt="2021-03-22T02:26:13.469" v="830" actId="47"/>
-        <pc:sldMkLst>
-          <pc:docMk/>
-          <pc:sldMk cId="4291129217" sldId="282"/>
-        </pc:sldMkLst>
-      </pc:sldChg>
-      <pc:sldChg chg="addSp modSp del mod">
-        <pc:chgData name="Weifeng Xu" userId="e7aed605-a3dd-4d5a-a692-a87037af107b" providerId="ADAL" clId="{4DC338DC-19C7-41EB-B9B2-C1FF8A2AEED8}" dt="2021-03-22T02:26:17.284" v="836" actId="47"/>
-        <pc:sldMkLst>
-          <pc:docMk/>
-          <pc:sldMk cId="1345239187" sldId="283"/>
-        </pc:sldMkLst>
-      </pc:sldChg>
-      <pc:sldChg chg="addSp delSp modSp del mod">
-        <pc:chgData name="Weifeng Xu" userId="e7aed605-a3dd-4d5a-a692-a87037af107b" providerId="ADAL" clId="{4DC338DC-19C7-41EB-B9B2-C1FF8A2AEED8}" dt="2021-03-22T02:26:17.872" v="837" actId="47"/>
-        <pc:sldMkLst>
-          <pc:docMk/>
-          <pc:sldMk cId="988206790" sldId="284"/>
-        </pc:sldMkLst>
-      </pc:sldChg>
-      <pc:sldChg chg="modSp del mod">
-        <pc:chgData name="Weifeng Xu" userId="e7aed605-a3dd-4d5a-a692-a87037af107b" providerId="ADAL" clId="{4DC338DC-19C7-41EB-B9B2-C1FF8A2AEED8}" dt="2021-03-22T02:26:18.440" v="838" actId="47"/>
-        <pc:sldMkLst>
-          <pc:docMk/>
-          <pc:sldMk cId="848153081" sldId="285"/>
-        </pc:sldMkLst>
-      </pc:sldChg>
-      <pc:sldChg chg="modSp del mod">
-        <pc:chgData name="Weifeng Xu" userId="e7aed605-a3dd-4d5a-a692-a87037af107b" providerId="ADAL" clId="{4DC338DC-19C7-41EB-B9B2-C1FF8A2AEED8}" dt="2021-03-22T02:26:20.669" v="842" actId="47"/>
-        <pc:sldMkLst>
-          <pc:docMk/>
-          <pc:sldMk cId="319929686" sldId="286"/>
-        </pc:sldMkLst>
-      </pc:sldChg>
-      <pc:sldChg chg="del">
-        <pc:chgData name="Weifeng Xu" userId="e7aed605-a3dd-4d5a-a692-a87037af107b" providerId="ADAL" clId="{4DC338DC-19C7-41EB-B9B2-C1FF8A2AEED8}" dt="2021-03-06T01:15:55.818" v="0" actId="47"/>
-        <pc:sldMkLst>
-          <pc:docMk/>
-          <pc:sldMk cId="2783025053" sldId="287"/>
-        </pc:sldMkLst>
-      </pc:sldChg>
-      <pc:sldChg chg="del">
-        <pc:chgData name="Weifeng Xu" userId="e7aed605-a3dd-4d5a-a692-a87037af107b" providerId="ADAL" clId="{4DC338DC-19C7-41EB-B9B2-C1FF8A2AEED8}" dt="2021-03-06T01:15:58.325" v="6" actId="47"/>
-        <pc:sldMkLst>
-          <pc:docMk/>
-          <pc:sldMk cId="114776636" sldId="288"/>
-        </pc:sldMkLst>
-      </pc:sldChg>
-      <pc:sldChg chg="del">
-        <pc:chgData name="Weifeng Xu" userId="e7aed605-a3dd-4d5a-a692-a87037af107b" providerId="ADAL" clId="{4DC338DC-19C7-41EB-B9B2-C1FF8A2AEED8}" dt="2021-03-06T01:15:56.509" v="1" actId="47"/>
-        <pc:sldMkLst>
-          <pc:docMk/>
-          <pc:sldMk cId="1757879576" sldId="293"/>
-        </pc:sldMkLst>
-      </pc:sldChg>
-      <pc:sldChg chg="del">
-        <pc:chgData name="Weifeng Xu" userId="e7aed605-a3dd-4d5a-a692-a87037af107b" providerId="ADAL" clId="{4DC338DC-19C7-41EB-B9B2-C1FF8A2AEED8}" dt="2021-03-06T01:15:56.918" v="2" actId="47"/>
-        <pc:sldMkLst>
-          <pc:docMk/>
-          <pc:sldMk cId="2207446241" sldId="294"/>
-        </pc:sldMkLst>
-      </pc:sldChg>
-      <pc:sldChg chg="del">
-        <pc:chgData name="Weifeng Xu" userId="e7aed605-a3dd-4d5a-a692-a87037af107b" providerId="ADAL" clId="{4DC338DC-19C7-41EB-B9B2-C1FF8A2AEED8}" dt="2021-03-22T02:26:16.816" v="835" actId="47"/>
-        <pc:sldMkLst>
-          <pc:docMk/>
-          <pc:sldMk cId="2323005149" sldId="296"/>
-        </pc:sldMkLst>
-      </pc:sldChg>
-      <pc:sldChg chg="del">
-        <pc:chgData name="Weifeng Xu" userId="e7aed605-a3dd-4d5a-a692-a87037af107b" providerId="ADAL" clId="{4DC338DC-19C7-41EB-B9B2-C1FF8A2AEED8}" dt="2021-03-06T01:15:57.141" v="3" actId="47"/>
-        <pc:sldMkLst>
-          <pc:docMk/>
-          <pc:sldMk cId="2224677796" sldId="297"/>
-        </pc:sldMkLst>
-      </pc:sldChg>
-      <pc:sldChg chg="del">
-        <pc:chgData name="Weifeng Xu" userId="e7aed605-a3dd-4d5a-a692-a87037af107b" providerId="ADAL" clId="{4DC338DC-19C7-41EB-B9B2-C1FF8A2AEED8}" dt="2021-03-06T01:15:57.352" v="4" actId="47"/>
-        <pc:sldMkLst>
-          <pc:docMk/>
-          <pc:sldMk cId="1105583169" sldId="298"/>
-        </pc:sldMkLst>
-      </pc:sldChg>
-      <pc:sldChg chg="del">
-        <pc:chgData name="Weifeng Xu" userId="e7aed605-a3dd-4d5a-a692-a87037af107b" providerId="ADAL" clId="{4DC338DC-19C7-41EB-B9B2-C1FF8A2AEED8}" dt="2021-03-06T01:15:57.773" v="5" actId="47"/>
-        <pc:sldMkLst>
-          <pc:docMk/>
-          <pc:sldMk cId="3471057309" sldId="299"/>
-        </pc:sldMkLst>
-      </pc:sldChg>
-      <pc:sldChg chg="del">
-        <pc:chgData name="Weifeng Xu" userId="e7aed605-a3dd-4d5a-a692-a87037af107b" providerId="ADAL" clId="{4DC338DC-19C7-41EB-B9B2-C1FF8A2AEED8}" dt="2021-03-06T01:15:58.558" v="7" actId="47"/>
-        <pc:sldMkLst>
-          <pc:docMk/>
-          <pc:sldMk cId="877061006" sldId="300"/>
-        </pc:sldMkLst>
-      </pc:sldChg>
-      <pc:sldChg chg="del">
-        <pc:chgData name="Weifeng Xu" userId="e7aed605-a3dd-4d5a-a692-a87037af107b" providerId="ADAL" clId="{4DC338DC-19C7-41EB-B9B2-C1FF8A2AEED8}" dt="2021-03-06T01:15:58.739" v="8" actId="47"/>
-        <pc:sldMkLst>
-          <pc:docMk/>
-          <pc:sldMk cId="2343196982" sldId="301"/>
-        </pc:sldMkLst>
-      </pc:sldChg>
-      <pc:sldChg chg="del">
-        <pc:chgData name="Weifeng Xu" userId="e7aed605-a3dd-4d5a-a692-a87037af107b" providerId="ADAL" clId="{4DC338DC-19C7-41EB-B9B2-C1FF8A2AEED8}" dt="2021-03-06T01:16:00.971" v="17" actId="47"/>
-        <pc:sldMkLst>
-          <pc:docMk/>
-          <pc:sldMk cId="493733997" sldId="302"/>
-        </pc:sldMkLst>
-      </pc:sldChg>
-      <pc:sldChg chg="del">
-        <pc:chgData name="Weifeng Xu" userId="e7aed605-a3dd-4d5a-a692-a87037af107b" providerId="ADAL" clId="{4DC338DC-19C7-41EB-B9B2-C1FF8A2AEED8}" dt="2021-03-06T01:15:58.930" v="9" actId="47"/>
-        <pc:sldMkLst>
-          <pc:docMk/>
-          <pc:sldMk cId="3476121000" sldId="303"/>
-        </pc:sldMkLst>
-      </pc:sldChg>
-      <pc:sldChg chg="modSp del mod">
-        <pc:chgData name="Weifeng Xu" userId="e7aed605-a3dd-4d5a-a692-a87037af107b" providerId="ADAL" clId="{4DC338DC-19C7-41EB-B9B2-C1FF8A2AEED8}" dt="2021-03-22T02:26:21.321" v="843" actId="47"/>
-        <pc:sldMkLst>
-          <pc:docMk/>
-          <pc:sldMk cId="53763807" sldId="304"/>
-        </pc:sldMkLst>
-      </pc:sldChg>
-      <pc:sldChg chg="del">
-        <pc:chgData name="Weifeng Xu" userId="e7aed605-a3dd-4d5a-a692-a87037af107b" providerId="ADAL" clId="{4DC338DC-19C7-41EB-B9B2-C1FF8A2AEED8}" dt="2021-03-06T01:15:59.145" v="10" actId="47"/>
-        <pc:sldMkLst>
-          <pc:docMk/>
-          <pc:sldMk cId="1618462415" sldId="305"/>
-        </pc:sldMkLst>
-      </pc:sldChg>
-      <pc:sldChg chg="del">
-        <pc:chgData name="Weifeng Xu" userId="e7aed605-a3dd-4d5a-a692-a87037af107b" providerId="ADAL" clId="{4DC338DC-19C7-41EB-B9B2-C1FF8A2AEED8}" dt="2021-03-06T01:15:59.352" v="11" actId="47"/>
-        <pc:sldMkLst>
-          <pc:docMk/>
-          <pc:sldMk cId="180323046" sldId="306"/>
-        </pc:sldMkLst>
-      </pc:sldChg>
-      <pc:sldChg chg="del">
-        <pc:chgData name="Weifeng Xu" userId="e7aed605-a3dd-4d5a-a692-a87037af107b" providerId="ADAL" clId="{4DC338DC-19C7-41EB-B9B2-C1FF8A2AEED8}" dt="2021-03-06T01:16:00.758" v="16" actId="47"/>
-        <pc:sldMkLst>
-          <pc:docMk/>
-          <pc:sldMk cId="3237227748" sldId="307"/>
-        </pc:sldMkLst>
-      </pc:sldChg>
-      <pc:sldChg chg="del">
-        <pc:chgData name="Weifeng Xu" userId="e7aed605-a3dd-4d5a-a692-a87037af107b" providerId="ADAL" clId="{4DC338DC-19C7-41EB-B9B2-C1FF8A2AEED8}" dt="2021-03-06T01:16:01.189" v="18" actId="47"/>
-        <pc:sldMkLst>
-          <pc:docMk/>
-          <pc:sldMk cId="1577270902" sldId="308"/>
-        </pc:sldMkLst>
-      </pc:sldChg>
-      <pc:sldChg chg="del">
-        <pc:chgData name="Weifeng Xu" userId="e7aed605-a3dd-4d5a-a692-a87037af107b" providerId="ADAL" clId="{4DC338DC-19C7-41EB-B9B2-C1FF8A2AEED8}" dt="2021-03-06T01:16:02.209" v="21" actId="47"/>
-        <pc:sldMkLst>
-          <pc:docMk/>
-          <pc:sldMk cId="181172030" sldId="309"/>
-        </pc:sldMkLst>
-      </pc:sldChg>
-      <pc:sldChg chg="del">
-        <pc:chgData name="Weifeng Xu" userId="e7aed605-a3dd-4d5a-a692-a87037af107b" providerId="ADAL" clId="{4DC338DC-19C7-41EB-B9B2-C1FF8A2AEED8}" dt="2021-03-06T01:16:01.572" v="19" actId="47"/>
-        <pc:sldMkLst>
-          <pc:docMk/>
-          <pc:sldMk cId="1809058598" sldId="310"/>
-        </pc:sldMkLst>
-      </pc:sldChg>
-      <pc:sldChg chg="del">
-        <pc:chgData name="Weifeng Xu" userId="e7aed605-a3dd-4d5a-a692-a87037af107b" providerId="ADAL" clId="{4DC338DC-19C7-41EB-B9B2-C1FF8A2AEED8}" dt="2021-03-06T01:16:01.968" v="20" actId="47"/>
-        <pc:sldMkLst>
-          <pc:docMk/>
-          <pc:sldMk cId="4192303" sldId="311"/>
-        </pc:sldMkLst>
-      </pc:sldChg>
-      <pc:sldChg chg="del">
-        <pc:chgData name="Weifeng Xu" userId="e7aed605-a3dd-4d5a-a692-a87037af107b" providerId="ADAL" clId="{4DC338DC-19C7-41EB-B9B2-C1FF8A2AEED8}" dt="2021-03-06T01:15:59.634" v="12" actId="47"/>
-        <pc:sldMkLst>
-          <pc:docMk/>
-          <pc:sldMk cId="591621681" sldId="312"/>
-        </pc:sldMkLst>
-      </pc:sldChg>
-      <pc:sldChg chg="del">
-        <pc:chgData name="Weifeng Xu" userId="e7aed605-a3dd-4d5a-a692-a87037af107b" providerId="ADAL" clId="{4DC338DC-19C7-41EB-B9B2-C1FF8A2AEED8}" dt="2021-03-06T01:15:59.941" v="13" actId="47"/>
-        <pc:sldMkLst>
-          <pc:docMk/>
-          <pc:sldMk cId="214490323" sldId="313"/>
-        </pc:sldMkLst>
-      </pc:sldChg>
-      <pc:sldChg chg="del">
-        <pc:chgData name="Weifeng Xu" userId="e7aed605-a3dd-4d5a-a692-a87037af107b" providerId="ADAL" clId="{4DC338DC-19C7-41EB-B9B2-C1FF8A2AEED8}" dt="2021-03-06T01:16:00.176" v="14" actId="47"/>
-        <pc:sldMkLst>
-          <pc:docMk/>
-          <pc:sldMk cId="3337387503" sldId="318"/>
-        </pc:sldMkLst>
-      </pc:sldChg>
-      <pc:sldChg chg="del">
-        <pc:chgData name="Weifeng Xu" userId="e7aed605-a3dd-4d5a-a692-a87037af107b" providerId="ADAL" clId="{4DC338DC-19C7-41EB-B9B2-C1FF8A2AEED8}" dt="2021-03-06T01:16:00.511" v="15" actId="47"/>
-        <pc:sldMkLst>
-          <pc:docMk/>
-          <pc:sldMk cId="2446382234" sldId="319"/>
-        </pc:sldMkLst>
-      </pc:sldChg>
-      <pc:sldChg chg="del">
-        <pc:chgData name="Weifeng Xu" userId="e7aed605-a3dd-4d5a-a692-a87037af107b" providerId="ADAL" clId="{4DC338DC-19C7-41EB-B9B2-C1FF8A2AEED8}" dt="2021-03-06T01:16:02.572" v="22" actId="47"/>
-        <pc:sldMkLst>
-          <pc:docMk/>
-          <pc:sldMk cId="3877897741" sldId="320"/>
-        </pc:sldMkLst>
-      </pc:sldChg>
-      <pc:sldChg chg="del">
-        <pc:chgData name="Weifeng Xu" userId="e7aed605-a3dd-4d5a-a692-a87037af107b" providerId="ADAL" clId="{4DC338DC-19C7-41EB-B9B2-C1FF8A2AEED8}" dt="2021-03-06T01:16:02.772" v="23" actId="47"/>
-        <pc:sldMkLst>
-          <pc:docMk/>
-          <pc:sldMk cId="926804527" sldId="321"/>
-        </pc:sldMkLst>
-      </pc:sldChg>
-      <pc:sldChg chg="add del">
-        <pc:chgData name="Weifeng Xu" userId="e7aed605-a3dd-4d5a-a692-a87037af107b" providerId="ADAL" clId="{4DC338DC-19C7-41EB-B9B2-C1FF8A2AEED8}" dt="2021-03-06T01:16:10.808" v="26" actId="47"/>
-        <pc:sldMkLst>
-          <pc:docMk/>
-          <pc:sldMk cId="3506800452" sldId="322"/>
-        </pc:sldMkLst>
-      </pc:sldChg>
-      <pc:sldChg chg="addSp modSp new del mod modClrScheme chgLayout modNotesTx">
-        <pc:chgData name="Weifeng Xu" userId="e7aed605-a3dd-4d5a-a692-a87037af107b" providerId="ADAL" clId="{4DC338DC-19C7-41EB-B9B2-C1FF8A2AEED8}" dt="2021-03-22T02:26:18.960" v="839" actId="47"/>
-        <pc:sldMkLst>
-          <pc:docMk/>
-          <pc:sldMk cId="3192494774" sldId="330"/>
-        </pc:sldMkLst>
-      </pc:sldChg>
-      <pc:sldChg chg="new del">
-        <pc:chgData name="Weifeng Xu" userId="e7aed605-a3dd-4d5a-a692-a87037af107b" providerId="ADAL" clId="{4DC338DC-19C7-41EB-B9B2-C1FF8A2AEED8}" dt="2021-03-06T15:07:54.310" v="28" actId="680"/>
-        <pc:sldMkLst>
-          <pc:docMk/>
-          <pc:sldMk cId="3204093995" sldId="330"/>
-        </pc:sldMkLst>
-      </pc:sldChg>
-      <pc:sldChg chg="addSp delSp modSp new del mod modClrScheme chgLayout modNotesTx">
-        <pc:chgData name="Weifeng Xu" userId="e7aed605-a3dd-4d5a-a692-a87037af107b" providerId="ADAL" clId="{4DC338DC-19C7-41EB-B9B2-C1FF8A2AEED8}" dt="2021-03-22T02:26:19.544" v="840" actId="47"/>
-        <pc:sldMkLst>
-          <pc:docMk/>
-          <pc:sldMk cId="2786836983" sldId="331"/>
-        </pc:sldMkLst>
-      </pc:sldChg>
-      <pc:sldChg chg="new del">
-        <pc:chgData name="Weifeng Xu" userId="e7aed605-a3dd-4d5a-a692-a87037af107b" providerId="ADAL" clId="{4DC338DC-19C7-41EB-B9B2-C1FF8A2AEED8}" dt="2021-03-06T15:39:53.920" v="76" actId="47"/>
-        <pc:sldMkLst>
-          <pc:docMk/>
-          <pc:sldMk cId="4264100167" sldId="332"/>
-        </pc:sldMkLst>
-      </pc:sldChg>
-      <pc:sldChg chg="addSp modSp new del mod">
-        <pc:chgData name="Weifeng Xu" userId="e7aed605-a3dd-4d5a-a692-a87037af107b" providerId="ADAL" clId="{4DC338DC-19C7-41EB-B9B2-C1FF8A2AEED8}" dt="2021-03-22T02:26:20.075" v="841" actId="47"/>
-        <pc:sldMkLst>
-          <pc:docMk/>
-          <pc:sldMk cId="3230497500" sldId="333"/>
-        </pc:sldMkLst>
-      </pc:sldChg>
-      <pc:sldChg chg="addSp delSp modSp new mod modClrScheme chgLayout modNotesTx">
-        <pc:chgData name="Weifeng Xu" userId="e7aed605-a3dd-4d5a-a692-a87037af107b" providerId="ADAL" clId="{4DC338DC-19C7-41EB-B9B2-C1FF8A2AEED8}" dt="2021-03-16T13:51:04.019" v="140"/>
-        <pc:sldMkLst>
-          <pc:docMk/>
-          <pc:sldMk cId="3494595657" sldId="334"/>
-        </pc:sldMkLst>
-      </pc:sldChg>
-      <pc:sldChg chg="addSp delSp modSp new mod modNotesTx">
-        <pc:chgData name="Weifeng Xu" userId="e7aed605-a3dd-4d5a-a692-a87037af107b" providerId="ADAL" clId="{4DC338DC-19C7-41EB-B9B2-C1FF8A2AEED8}" dt="2021-03-16T14:34:41.439" v="306" actId="14100"/>
-        <pc:sldMkLst>
-          <pc:docMk/>
-          <pc:sldMk cId="3364671392" sldId="335"/>
         </pc:sldMkLst>
       </pc:sldChg>
     </pc:docChg>
@@ -1746,92 +1832,6 @@
             <ac:picMk id="6" creationId="{77592727-3D55-BC8D-56DF-BD9CDBC352B4}"/>
           </ac:picMkLst>
         </pc:picChg>
-      </pc:sldChg>
-    </pc:docChg>
-  </pc:docChgLst>
-  <pc:docChgLst>
-    <pc:chgData name="Weifeng Xu" userId="e7aed605-a3dd-4d5a-a692-a87037af107b" providerId="ADAL" clId="{E0A36AE6-DAEB-4086-8CDB-3902B8401090}"/>
-    <pc:docChg chg="undo custSel mod addSld delSld modSld">
-      <pc:chgData name="Weifeng Xu" userId="e7aed605-a3dd-4d5a-a692-a87037af107b" providerId="ADAL" clId="{E0A36AE6-DAEB-4086-8CDB-3902B8401090}" dt="2021-01-18T00:01:06.800" v="260" actId="6549"/>
-      <pc:docMkLst>
-        <pc:docMk/>
-      </pc:docMkLst>
-      <pc:sldChg chg="addSp delSp modSp mod setBg">
-        <pc:chgData name="Weifeng Xu" userId="e7aed605-a3dd-4d5a-a692-a87037af107b" providerId="ADAL" clId="{E0A36AE6-DAEB-4086-8CDB-3902B8401090}" dt="2021-01-17T23:59:46.284" v="256" actId="26606"/>
-        <pc:sldMkLst>
-          <pc:docMk/>
-          <pc:sldMk cId="1392771324" sldId="258"/>
-        </pc:sldMkLst>
-      </pc:sldChg>
-      <pc:sldChg chg="del">
-        <pc:chgData name="Weifeng Xu" userId="e7aed605-a3dd-4d5a-a692-a87037af107b" providerId="ADAL" clId="{E0A36AE6-DAEB-4086-8CDB-3902B8401090}" dt="2021-01-17T23:45:25.843" v="81" actId="47"/>
-        <pc:sldMkLst>
-          <pc:docMk/>
-          <pc:sldMk cId="627889270" sldId="259"/>
-        </pc:sldMkLst>
-      </pc:sldChg>
-      <pc:sldChg chg="modSp new mod">
-        <pc:chgData name="Weifeng Xu" userId="e7aed605-a3dd-4d5a-a692-a87037af107b" providerId="ADAL" clId="{E0A36AE6-DAEB-4086-8CDB-3902B8401090}" dt="2021-01-17T23:53:10.893" v="178" actId="20577"/>
-        <pc:sldMkLst>
-          <pc:docMk/>
-          <pc:sldMk cId="2206727044" sldId="259"/>
-        </pc:sldMkLst>
-      </pc:sldChg>
-      <pc:sldChg chg="del">
-        <pc:chgData name="Weifeng Xu" userId="e7aed605-a3dd-4d5a-a692-a87037af107b" providerId="ADAL" clId="{E0A36AE6-DAEB-4086-8CDB-3902B8401090}" dt="2021-01-17T23:45:25.974" v="82" actId="47"/>
-        <pc:sldMkLst>
-          <pc:docMk/>
-          <pc:sldMk cId="1241162418" sldId="260"/>
-        </pc:sldMkLst>
-      </pc:sldChg>
-      <pc:sldChg chg="addSp modSp new mod setBg">
-        <pc:chgData name="Weifeng Xu" userId="e7aed605-a3dd-4d5a-a692-a87037af107b" providerId="ADAL" clId="{E0A36AE6-DAEB-4086-8CDB-3902B8401090}" dt="2021-01-18T00:01:06.800" v="260" actId="6549"/>
-        <pc:sldMkLst>
-          <pc:docMk/>
-          <pc:sldMk cId="3022601266" sldId="260"/>
-        </pc:sldMkLst>
-      </pc:sldChg>
-      <pc:sldChg chg="del">
-        <pc:chgData name="Weifeng Xu" userId="e7aed605-a3dd-4d5a-a692-a87037af107b" providerId="ADAL" clId="{E0A36AE6-DAEB-4086-8CDB-3902B8401090}" dt="2021-01-17T23:45:26.140" v="83" actId="47"/>
-        <pc:sldMkLst>
-          <pc:docMk/>
-          <pc:sldMk cId="2722048472" sldId="261"/>
-        </pc:sldMkLst>
-      </pc:sldChg>
-      <pc:sldChg chg="del">
-        <pc:chgData name="Weifeng Xu" userId="e7aed605-a3dd-4d5a-a692-a87037af107b" providerId="ADAL" clId="{E0A36AE6-DAEB-4086-8CDB-3902B8401090}" dt="2021-01-17T23:45:26.285" v="84" actId="47"/>
-        <pc:sldMkLst>
-          <pc:docMk/>
-          <pc:sldMk cId="988553735" sldId="262"/>
-        </pc:sldMkLst>
-      </pc:sldChg>
-      <pc:sldChg chg="del">
-        <pc:chgData name="Weifeng Xu" userId="e7aed605-a3dd-4d5a-a692-a87037af107b" providerId="ADAL" clId="{E0A36AE6-DAEB-4086-8CDB-3902B8401090}" dt="2021-01-17T23:45:26.428" v="85" actId="47"/>
-        <pc:sldMkLst>
-          <pc:docMk/>
-          <pc:sldMk cId="1237432803" sldId="263"/>
-        </pc:sldMkLst>
-      </pc:sldChg>
-      <pc:sldChg chg="del">
-        <pc:chgData name="Weifeng Xu" userId="e7aed605-a3dd-4d5a-a692-a87037af107b" providerId="ADAL" clId="{E0A36AE6-DAEB-4086-8CDB-3902B8401090}" dt="2021-01-17T23:45:26.580" v="86" actId="47"/>
-        <pc:sldMkLst>
-          <pc:docMk/>
-          <pc:sldMk cId="2602603962" sldId="264"/>
-        </pc:sldMkLst>
-      </pc:sldChg>
-      <pc:sldChg chg="del">
-        <pc:chgData name="Weifeng Xu" userId="e7aed605-a3dd-4d5a-a692-a87037af107b" providerId="ADAL" clId="{E0A36AE6-DAEB-4086-8CDB-3902B8401090}" dt="2021-01-17T23:45:26.781" v="87" actId="47"/>
-        <pc:sldMkLst>
-          <pc:docMk/>
-          <pc:sldMk cId="3419174452" sldId="265"/>
-        </pc:sldMkLst>
-      </pc:sldChg>
-      <pc:sldChg chg="del">
-        <pc:chgData name="Weifeng Xu" userId="e7aed605-a3dd-4d5a-a692-a87037af107b" providerId="ADAL" clId="{E0A36AE6-DAEB-4086-8CDB-3902B8401090}" dt="2021-01-17T23:45:26.965" v="88" actId="47"/>
-        <pc:sldMkLst>
-          <pc:docMk/>
-          <pc:sldMk cId="1160958258" sldId="266"/>
-        </pc:sldMkLst>
       </pc:sldChg>
     </pc:docChg>
   </pc:docChgLst>
@@ -4809,7 +4809,7 @@
           <a:p>
             <a:fld id="{EE41F6E3-57F9-402E-BDBA-5B2DE11C8530}" type="datetimeFigureOut">
               <a:rPr lang="en-US" smtClean="0"/>
-              <a:t>2/9/2025</a:t>
+              <a:t>8/26/2025</a:t>
             </a:fld>
             <a:endParaRPr lang="en-US"/>
           </a:p>
@@ -7331,7 +7331,7 @@
           <a:p>
             <a:fld id="{4263717A-E3C1-4BED-ABE0-B7069385E023}" type="datetimeFigureOut">
               <a:rPr lang="en-US" smtClean="0"/>
-              <a:t>2/9/2025</a:t>
+              <a:t>8/26/2025</a:t>
             </a:fld>
             <a:endParaRPr lang="en-US"/>
           </a:p>
@@ -7504,7 +7504,7 @@
           <a:p>
             <a:fld id="{4263717A-E3C1-4BED-ABE0-B7069385E023}" type="datetimeFigureOut">
               <a:rPr lang="en-US" smtClean="0"/>
-              <a:t>2/9/2025</a:t>
+              <a:t>8/26/2025</a:t>
             </a:fld>
             <a:endParaRPr lang="en-US"/>
           </a:p>
@@ -7682,7 +7682,7 @@
           <a:p>
             <a:fld id="{4263717A-E3C1-4BED-ABE0-B7069385E023}" type="datetimeFigureOut">
               <a:rPr lang="en-US" smtClean="0"/>
-              <a:t>2/9/2025</a:t>
+              <a:t>8/26/2025</a:t>
             </a:fld>
             <a:endParaRPr lang="en-US"/>
           </a:p>
@@ -7850,7 +7850,7 @@
           <a:p>
             <a:fld id="{4263717A-E3C1-4BED-ABE0-B7069385E023}" type="datetimeFigureOut">
               <a:rPr lang="en-US" smtClean="0"/>
-              <a:t>2/9/2025</a:t>
+              <a:t>8/26/2025</a:t>
             </a:fld>
             <a:endParaRPr lang="en-US"/>
           </a:p>
@@ -8095,7 +8095,7 @@
           <a:p>
             <a:fld id="{4263717A-E3C1-4BED-ABE0-B7069385E023}" type="datetimeFigureOut">
               <a:rPr lang="en-US" smtClean="0"/>
-              <a:t>2/9/2025</a:t>
+              <a:t>8/26/2025</a:t>
             </a:fld>
             <a:endParaRPr lang="en-US"/>
           </a:p>
@@ -8324,7 +8324,7 @@
           <a:p>
             <a:fld id="{4263717A-E3C1-4BED-ABE0-B7069385E023}" type="datetimeFigureOut">
               <a:rPr lang="en-US" smtClean="0"/>
-              <a:t>2/9/2025</a:t>
+              <a:t>8/26/2025</a:t>
             </a:fld>
             <a:endParaRPr lang="en-US"/>
           </a:p>
@@ -8688,7 +8688,7 @@
           <a:p>
             <a:fld id="{4263717A-E3C1-4BED-ABE0-B7069385E023}" type="datetimeFigureOut">
               <a:rPr lang="en-US" smtClean="0"/>
-              <a:t>2/9/2025</a:t>
+              <a:t>8/26/2025</a:t>
             </a:fld>
             <a:endParaRPr lang="en-US"/>
           </a:p>
@@ -8805,7 +8805,7 @@
           <a:p>
             <a:fld id="{4263717A-E3C1-4BED-ABE0-B7069385E023}" type="datetimeFigureOut">
               <a:rPr lang="en-US" smtClean="0"/>
-              <a:t>2/9/2025</a:t>
+              <a:t>8/26/2025</a:t>
             </a:fld>
             <a:endParaRPr lang="en-US"/>
           </a:p>
@@ -8900,7 +8900,7 @@
           <a:p>
             <a:fld id="{4263717A-E3C1-4BED-ABE0-B7069385E023}" type="datetimeFigureOut">
               <a:rPr lang="en-US" smtClean="0"/>
-              <a:t>2/9/2025</a:t>
+              <a:t>8/26/2025</a:t>
             </a:fld>
             <a:endParaRPr lang="en-US"/>
           </a:p>
@@ -9175,7 +9175,7 @@
           <a:p>
             <a:fld id="{4263717A-E3C1-4BED-ABE0-B7069385E023}" type="datetimeFigureOut">
               <a:rPr lang="en-US" smtClean="0"/>
-              <a:t>2/9/2025</a:t>
+              <a:t>8/26/2025</a:t>
             </a:fld>
             <a:endParaRPr lang="en-US"/>
           </a:p>
@@ -9427,7 +9427,7 @@
           <a:p>
             <a:fld id="{4263717A-E3C1-4BED-ABE0-B7069385E023}" type="datetimeFigureOut">
               <a:rPr lang="en-US" smtClean="0"/>
-              <a:t>2/9/2025</a:t>
+              <a:t>8/26/2025</a:t>
             </a:fld>
             <a:endParaRPr lang="en-US"/>
           </a:p>
@@ -9638,7 +9638,7 @@
           <a:p>
             <a:fld id="{4263717A-E3C1-4BED-ABE0-B7069385E023}" type="datetimeFigureOut">
               <a:rPr lang="en-US" smtClean="0"/>
-              <a:t>2/9/2025</a:t>
+              <a:t>8/26/2025</a:t>
             </a:fld>
             <a:endParaRPr lang="en-US"/>
           </a:p>
@@ -10432,7 +10432,7 @@
           <p:nvPr/>
         </p:nvPicPr>
         <p:blipFill>
-          <a:blip r:embed="rId2">
+          <a:blip r:embed="rId2" cstate="print">
             <a:extLst>
               <a:ext uri="{28A0092B-C50C-407E-A947-70E740481C1C}">
                 <a14:useLocalDpi xmlns:a14="http://schemas.microsoft.com/office/drawing/2010/main" val="0"/>
@@ -11076,6 +11076,89 @@
                 <a:schemeClr val="bg1"/>
               </a:solidFill>
             </a:endParaRPr>
+          </a:p>
+        </p:txBody>
+      </p:sp>
+      <p:cxnSp>
+        <p:nvCxnSpPr>
+          <p:cNvPr id="5" name="Straight Arrow Connector 4">
+            <a:extLst>
+              <a:ext uri="{FF2B5EF4-FFF2-40B4-BE49-F238E27FC236}">
+                <a16:creationId xmlns:a16="http://schemas.microsoft.com/office/drawing/2014/main" id="{601E2C76-529B-7937-C972-3E8146CED945}"/>
+              </a:ext>
+            </a:extLst>
+          </p:cNvPr>
+          <p:cNvCxnSpPr>
+            <a:cxnSpLocks/>
+          </p:cNvCxnSpPr>
+          <p:nvPr/>
+        </p:nvCxnSpPr>
+        <p:spPr>
+          <a:xfrm flipH="1" flipV="1">
+            <a:off x="7688580" y="3483295"/>
+            <a:ext cx="1420368" cy="273365"/>
+          </a:xfrm>
+          <a:prstGeom prst="straightConnector1">
+            <a:avLst/>
+          </a:prstGeom>
+          <a:ln w="57150">
+            <a:solidFill>
+              <a:srgbClr val="FF0000"/>
+            </a:solidFill>
+            <a:tailEnd type="triangle"/>
+          </a:ln>
+        </p:spPr>
+        <p:style>
+          <a:lnRef idx="1">
+            <a:schemeClr val="accent1"/>
+          </a:lnRef>
+          <a:fillRef idx="0">
+            <a:schemeClr val="accent1"/>
+          </a:fillRef>
+          <a:effectRef idx="0">
+            <a:schemeClr val="accent1"/>
+          </a:effectRef>
+          <a:fontRef idx="minor">
+            <a:schemeClr val="tx1"/>
+          </a:fontRef>
+        </p:style>
+      </p:cxnSp>
+      <p:sp>
+        <p:nvSpPr>
+          <p:cNvPr id="12" name="TextBox 11">
+            <a:extLst>
+              <a:ext uri="{FF2B5EF4-FFF2-40B4-BE49-F238E27FC236}">
+                <a16:creationId xmlns:a16="http://schemas.microsoft.com/office/drawing/2014/main" id="{42EA6C72-4B41-FACF-E2B0-0BBA57EC15C2}"/>
+              </a:ext>
+            </a:extLst>
+          </p:cNvPr>
+          <p:cNvSpPr txBox="1"/>
+          <p:nvPr/>
+        </p:nvSpPr>
+        <p:spPr>
+          <a:xfrm>
+            <a:off x="9243060" y="3593484"/>
+            <a:ext cx="1650324" cy="369332"/>
+          </a:xfrm>
+          <a:prstGeom prst="rect">
+            <a:avLst/>
+          </a:prstGeom>
+          <a:noFill/>
+        </p:spPr>
+        <p:txBody>
+          <a:bodyPr wrap="none" rtlCol="0">
+            <a:spAutoFit/>
+          </a:bodyPr>
+          <a:lstStyle/>
+          <a:p>
+            <a:r>
+              <a:rPr lang="en-US" dirty="0">
+                <a:solidFill>
+                  <a:srgbClr val="FF0000"/>
+                </a:solidFill>
+              </a:rPr>
+              <a:t>most important</a:t>
+            </a:r>
           </a:p>
         </p:txBody>
       </p:sp>
@@ -11183,7 +11266,7 @@
           <p:nvPr/>
         </p:nvPicPr>
         <p:blipFill>
-          <a:blip r:embed="rId5">
+          <a:blip r:embed="rId5" cstate="print">
             <a:extLst>
               <a:ext uri="{28A0092B-C50C-407E-A947-70E740481C1C}">
                 <a14:useLocalDpi xmlns:a14="http://schemas.microsoft.com/office/drawing/2010/main" val="0"/>
@@ -12734,7 +12817,7 @@
           <p:nvPr/>
         </p:nvPicPr>
         <p:blipFill>
-          <a:blip r:embed="rId3">
+          <a:blip r:embed="rId3" cstate="print">
             <a:extLst>
               <a:ext uri="{28A0092B-C50C-407E-A947-70E740481C1C}">
                 <a14:useLocalDpi xmlns:a14="http://schemas.microsoft.com/office/drawing/2010/main" val="0"/>
@@ -12868,6 +12951,42 @@
               <a:rPr lang="en-US" dirty="0"/>
               <a:t>Dalvik Executable</a:t>
             </a:r>
+          </a:p>
+        </p:txBody>
+      </p:sp>
+      <p:sp>
+        <p:nvSpPr>
+          <p:cNvPr id="5" name="TextBox 4">
+            <a:extLst>
+              <a:ext uri="{FF2B5EF4-FFF2-40B4-BE49-F238E27FC236}">
+                <a16:creationId xmlns:a16="http://schemas.microsoft.com/office/drawing/2014/main" id="{86A87FD2-CBD1-A64C-088A-C5DEBC6EEF30}"/>
+              </a:ext>
+            </a:extLst>
+          </p:cNvPr>
+          <p:cNvSpPr txBox="1"/>
+          <p:nvPr/>
+        </p:nvSpPr>
+        <p:spPr>
+          <a:xfrm>
+            <a:off x="9532620" y="3154164"/>
+            <a:ext cx="2125980" cy="1384995"/>
+          </a:xfrm>
+          <a:prstGeom prst="rect">
+            <a:avLst/>
+          </a:prstGeom>
+          <a:noFill/>
+        </p:spPr>
+        <p:txBody>
+          <a:bodyPr wrap="square">
+            <a:spAutoFit/>
+          </a:bodyPr>
+          <a:lstStyle/>
+          <a:p>
+            <a:r>
+              <a:rPr lang="en-GB" sz="1400" dirty="0"/>
+              <a:t>low-level programming languages, such as C or C++, that can be directly executed by a computer's hardware or a specific processor architecture</a:t>
+            </a:r>
+            <a:endParaRPr lang="en-US" sz="1400" dirty="0"/>
           </a:p>
         </p:txBody>
       </p:sp>

</xml_diff>